<commit_message>
field work and constitution final
</commit_message>
<xml_diff>
--- a/Business/Official Documents/UNH SEDS/Organizational Officers Chart.pptx
+++ b/Business/Official Documents/UNH SEDS/Organizational Officers Chart.pptx
@@ -241,7 +241,7 @@
           <a:p>
             <a:fld id="{8EA400C4-A3C8-4428-B966-8D3C5CBFCD3C}" type="datetimeFigureOut">
               <a:rPr lang="en-US" smtClean="0"/>
-              <a:t>1/23/2019</a:t>
+              <a:t>1/31/2019</a:t>
             </a:fld>
             <a:endParaRPr lang="en-US"/>
           </a:p>
@@ -409,7 +409,7 @@
           <a:p>
             <a:fld id="{8EA400C4-A3C8-4428-B966-8D3C5CBFCD3C}" type="datetimeFigureOut">
               <a:rPr lang="en-US" smtClean="0"/>
-              <a:t>1/23/2019</a:t>
+              <a:t>1/31/2019</a:t>
             </a:fld>
             <a:endParaRPr lang="en-US"/>
           </a:p>
@@ -587,7 +587,7 @@
           <a:p>
             <a:fld id="{8EA400C4-A3C8-4428-B966-8D3C5CBFCD3C}" type="datetimeFigureOut">
               <a:rPr lang="en-US" smtClean="0"/>
-              <a:t>1/23/2019</a:t>
+              <a:t>1/31/2019</a:t>
             </a:fld>
             <a:endParaRPr lang="en-US"/>
           </a:p>
@@ -755,7 +755,7 @@
           <a:p>
             <a:fld id="{8EA400C4-A3C8-4428-B966-8D3C5CBFCD3C}" type="datetimeFigureOut">
               <a:rPr lang="en-US" smtClean="0"/>
-              <a:t>1/23/2019</a:t>
+              <a:t>1/31/2019</a:t>
             </a:fld>
             <a:endParaRPr lang="en-US"/>
           </a:p>
@@ -1000,7 +1000,7 @@
           <a:p>
             <a:fld id="{8EA400C4-A3C8-4428-B966-8D3C5CBFCD3C}" type="datetimeFigureOut">
               <a:rPr lang="en-US" smtClean="0"/>
-              <a:t>1/23/2019</a:t>
+              <a:t>1/31/2019</a:t>
             </a:fld>
             <a:endParaRPr lang="en-US"/>
           </a:p>
@@ -1229,7 +1229,7 @@
           <a:p>
             <a:fld id="{8EA400C4-A3C8-4428-B966-8D3C5CBFCD3C}" type="datetimeFigureOut">
               <a:rPr lang="en-US" smtClean="0"/>
-              <a:t>1/23/2019</a:t>
+              <a:t>1/31/2019</a:t>
             </a:fld>
             <a:endParaRPr lang="en-US"/>
           </a:p>
@@ -1593,7 +1593,7 @@
           <a:p>
             <a:fld id="{8EA400C4-A3C8-4428-B966-8D3C5CBFCD3C}" type="datetimeFigureOut">
               <a:rPr lang="en-US" smtClean="0"/>
-              <a:t>1/23/2019</a:t>
+              <a:t>1/31/2019</a:t>
             </a:fld>
             <a:endParaRPr lang="en-US"/>
           </a:p>
@@ -1710,7 +1710,7 @@
           <a:p>
             <a:fld id="{8EA400C4-A3C8-4428-B966-8D3C5CBFCD3C}" type="datetimeFigureOut">
               <a:rPr lang="en-US" smtClean="0"/>
-              <a:t>1/23/2019</a:t>
+              <a:t>1/31/2019</a:t>
             </a:fld>
             <a:endParaRPr lang="en-US"/>
           </a:p>
@@ -1805,7 +1805,7 @@
           <a:p>
             <a:fld id="{8EA400C4-A3C8-4428-B966-8D3C5CBFCD3C}" type="datetimeFigureOut">
               <a:rPr lang="en-US" smtClean="0"/>
-              <a:t>1/23/2019</a:t>
+              <a:t>1/31/2019</a:t>
             </a:fld>
             <a:endParaRPr lang="en-US"/>
           </a:p>
@@ -2080,7 +2080,7 @@
           <a:p>
             <a:fld id="{8EA400C4-A3C8-4428-B966-8D3C5CBFCD3C}" type="datetimeFigureOut">
               <a:rPr lang="en-US" smtClean="0"/>
-              <a:t>1/23/2019</a:t>
+              <a:t>1/31/2019</a:t>
             </a:fld>
             <a:endParaRPr lang="en-US"/>
           </a:p>
@@ -2332,7 +2332,7 @@
           <a:p>
             <a:fld id="{8EA400C4-A3C8-4428-B966-8D3C5CBFCD3C}" type="datetimeFigureOut">
               <a:rPr lang="en-US" smtClean="0"/>
-              <a:t>1/23/2019</a:t>
+              <a:t>1/31/2019</a:t>
             </a:fld>
             <a:endParaRPr lang="en-US"/>
           </a:p>
@@ -2543,7 +2543,7 @@
           <a:p>
             <a:fld id="{8EA400C4-A3C8-4428-B966-8D3C5CBFCD3C}" type="datetimeFigureOut">
               <a:rPr lang="en-US" smtClean="0"/>
-              <a:t>1/23/2019</a:t>
+              <a:t>1/31/2019</a:t>
             </a:fld>
             <a:endParaRPr lang="en-US"/>
           </a:p>
@@ -3036,49 +3036,6 @@
       </p:sp>
       <p:sp>
         <p:nvSpPr>
-          <p:cNvPr id="7" name="TextBox 6"/>
-          <p:cNvSpPr txBox="1"/>
-          <p:nvPr/>
-        </p:nvSpPr>
-        <p:spPr>
-          <a:xfrm>
-            <a:off x="3626483" y="2634929"/>
-            <a:ext cx="1537855" cy="307777"/>
-          </a:xfrm>
-          <a:prstGeom prst="rect">
-            <a:avLst/>
-          </a:prstGeom>
-        </p:spPr>
-        <p:style>
-          <a:lnRef idx="2">
-            <a:schemeClr val="dk1"/>
-          </a:lnRef>
-          <a:fillRef idx="1">
-            <a:schemeClr val="lt1"/>
-          </a:fillRef>
-          <a:effectRef idx="0">
-            <a:schemeClr val="dk1"/>
-          </a:effectRef>
-          <a:fontRef idx="minor">
-            <a:schemeClr val="dk1"/>
-          </a:fontRef>
-        </p:style>
-        <p:txBody>
-          <a:bodyPr wrap="square" rtlCol="0">
-            <a:spAutoFit/>
-          </a:bodyPr>
-          <a:lstStyle/>
-          <a:p>
-            <a:pPr algn="ctr"/>
-            <a:r>
-              <a:rPr lang="en-US" sz="1400" dirty="0"/>
-              <a:t>Secretary</a:t>
-            </a:r>
-          </a:p>
-        </p:txBody>
-      </p:sp>
-      <p:sp>
-        <p:nvSpPr>
           <p:cNvPr id="8" name="TextBox 7"/>
           <p:cNvSpPr txBox="1"/>
           <p:nvPr/>
@@ -3485,40 +3442,6 @@
           <a:xfrm flipH="1">
             <a:off x="3570317" y="1786603"/>
             <a:ext cx="837658" cy="464795"/>
-          </a:xfrm>
-          <a:prstGeom prst="line">
-            <a:avLst/>
-          </a:prstGeom>
-        </p:spPr>
-        <p:style>
-          <a:lnRef idx="1">
-            <a:schemeClr val="accent1"/>
-          </a:lnRef>
-          <a:fillRef idx="0">
-            <a:schemeClr val="accent1"/>
-          </a:fillRef>
-          <a:effectRef idx="0">
-            <a:schemeClr val="accent1"/>
-          </a:effectRef>
-          <a:fontRef idx="minor">
-            <a:schemeClr val="tx1"/>
-          </a:fontRef>
-        </p:style>
-      </p:cxnSp>
-      <p:cxnSp>
-        <p:nvCxnSpPr>
-          <p:cNvPr id="25" name="Straight Connector 24"/>
-          <p:cNvCxnSpPr>
-            <a:cxnSpLocks/>
-            <a:stCxn id="9" idx="2"/>
-            <a:endCxn id="7" idx="0"/>
-          </p:cNvCxnSpPr>
-          <p:nvPr/>
-        </p:nvCxnSpPr>
-        <p:spPr>
-          <a:xfrm flipH="1">
-            <a:off x="4395411" y="1786603"/>
-            <a:ext cx="12564" cy="848326"/>
           </a:xfrm>
           <a:prstGeom prst="line">
             <a:avLst/>

</xml_diff>